<commit_message>
updated slides for 07a-c and added 01 as a pptx slide.
</commit_message>
<xml_diff>
--- a/slides/Online/2020/07a - finalVariables.pptx
+++ b/slides/Online/2020/07a - finalVariables.pptx
@@ -217,7 +217,7 @@
           <a:p>
             <a:fld id="{4D7E51A5-B478-1E40-8CBB-0DAA8831E99D}" type="datetimeFigureOut">
               <a:rPr lang="en-US" smtClean="0"/>
-              <a:t>3/15/20</a:t>
+              <a:t>4/7/20</a:t>
             </a:fld>
             <a:endParaRPr lang="en-US"/>
           </a:p>
@@ -382,7 +382,7 @@
           <a:p>
             <a:fld id="{D0ED587F-861E-6740-9643-E3DDAE89B8D6}" type="datetimeFigureOut">
               <a:rPr lang="en-US" smtClean="0"/>
-              <a:t>3/15/20</a:t>
+              <a:t>4/7/20</a:t>
             </a:fld>
             <a:endParaRPr lang="en-US"/>
           </a:p>
@@ -4275,8 +4275,8 @@
         </p:blipFill>
         <p:spPr>
           <a:xfrm>
-            <a:off x="9827882" y="6733969"/>
-            <a:ext cx="3520440" cy="787424"/>
+            <a:off x="10297550" y="6839021"/>
+            <a:ext cx="3050771" cy="682372"/>
           </a:xfrm>
           <a:prstGeom prst="rect">
             <a:avLst/>
@@ -4297,7 +4297,7 @@
         </p:nvSpPr>
         <p:spPr>
           <a:xfrm>
-            <a:off x="10549054" y="7264322"/>
+            <a:off x="10850448" y="7283950"/>
             <a:ext cx="2497873" cy="276999"/>
           </a:xfrm>
           <a:prstGeom prst="rect">
@@ -4336,8 +4336,8 @@
         </p:nvSpPr>
         <p:spPr>
           <a:xfrm>
-            <a:off x="9287446" y="7508206"/>
-            <a:ext cx="4601311" cy="246221"/>
+            <a:off x="9798728" y="7519397"/>
+            <a:ext cx="4601311" cy="215444"/>
           </a:xfrm>
           <a:prstGeom prst="rect">
             <a:avLst/>
@@ -4358,7 +4358,7 @@
               </a:spcAft>
             </a:pPr>
             <a:r>
-              <a:rPr lang="en-US" sz="1000" b="0" i="0" u="none" strike="noStrike" dirty="0">
+              <a:rPr lang="en-US" sz="800" b="0" i="0" u="none" strike="noStrike" dirty="0">
                 <a:solidFill>
                   <a:srgbClr val="7F7F7F"/>
                 </a:solidFill>
@@ -4368,7 +4368,7 @@
               <a:t>Slides Originally Created by Albert Lionelle (</a:t>
             </a:r>
             <a:r>
-              <a:rPr lang="en-US" sz="1000" b="0" i="0" u="none" strike="noStrike" dirty="0" err="1">
+              <a:rPr lang="en-US" sz="800" b="0" i="0" u="none" strike="noStrike" dirty="0" err="1">
                 <a:solidFill>
                   <a:srgbClr val="7F7F7F"/>
                 </a:solidFill>
@@ -4378,7 +4378,7 @@
               <a:t>Albert.Lionelle@colostate.edu</a:t>
             </a:r>
             <a:r>
-              <a:rPr lang="en-US" sz="1000" b="0" i="0" u="none" strike="noStrike" dirty="0">
+              <a:rPr lang="en-US" sz="800" b="0" i="0" u="none" strike="noStrike" dirty="0">
                 <a:solidFill>
                   <a:srgbClr val="7F7F7F"/>
                 </a:solidFill>
@@ -4387,7 +4387,7 @@
               </a:rPr>
               <a:t>)</a:t>
             </a:r>
-            <a:endParaRPr lang="en-US" sz="1000" b="0" dirty="0">
+            <a:endParaRPr lang="en-US" sz="800" b="0" dirty="0">
               <a:solidFill>
                 <a:srgbClr val="7F7F7F"/>
               </a:solidFill>
@@ -7510,7 +7510,7 @@
                 <a:latin typeface="Consolas" panose="020B0609020204030204" pitchFamily="49" charset="0"/>
                 <a:cs typeface="Consolas" panose="020B0609020204030204" pitchFamily="49" charset="0"/>
               </a:rPr>
-              <a:t>public final int PI = 3.14;</a:t>
+              <a:t>public final double PI = 3.14;</a:t>
             </a:r>
           </a:p>
           <a:p>
@@ -7542,7 +7542,7 @@
         </p:nvSpPr>
         <p:spPr>
           <a:xfrm>
-            <a:off x="8918532" y="5512129"/>
+            <a:off x="9031074" y="201837"/>
             <a:ext cx="4609578" cy="1508105"/>
           </a:xfrm>
           <a:prstGeom prst="rect">
@@ -7662,7 +7662,7 @@
         </p:nvSpPr>
         <p:spPr>
           <a:xfrm>
-            <a:off x="7841293" y="2098499"/>
+            <a:off x="7841293" y="1924547"/>
             <a:ext cx="5348235" cy="4052456"/>
           </a:xfrm>
         </p:spPr>
@@ -7888,7 +7888,7 @@
                 <a:latin typeface="Consolas" panose="020B0609020204030204" pitchFamily="49" charset="0"/>
                 <a:cs typeface="Consolas" panose="020B0609020204030204" pitchFamily="49" charset="0"/>
               </a:rPr>
-              <a:t> = LEAGUE + “: Laser Eyes”;  // ERROR!! won’t compile</a:t>
+              <a:t> = LEAGUE + “: Laser Eyes”;  </a:t>
             </a:r>
           </a:p>
           <a:p>
@@ -7921,10 +7921,13 @@
               </a:rPr>
               <a:t>rtn</a:t>
             </a:r>
-            <a:endParaRPr lang="en-US" sz="1400" dirty="0">
-              <a:latin typeface="Consolas" panose="020B0609020204030204" pitchFamily="49" charset="0"/>
-              <a:cs typeface="Consolas" panose="020B0609020204030204" pitchFamily="49" charset="0"/>
-            </a:endParaRPr>
+            <a:r>
+              <a:rPr lang="en-US" sz="1400" dirty="0">
+                <a:latin typeface="Consolas" panose="020B0609020204030204" pitchFamily="49" charset="0"/>
+                <a:cs typeface="Consolas" panose="020B0609020204030204" pitchFamily="49" charset="0"/>
+              </a:rPr>
+              <a:t>;</a:t>
+            </a:r>
           </a:p>
           <a:p>
             <a:r>
@@ -8033,36 +8036,22 @@
                 <a:latin typeface="Consolas" panose="020B0609020204030204" pitchFamily="49" charset="0"/>
                 <a:cs typeface="Consolas" panose="020B0609020204030204" pitchFamily="49" charset="0"/>
               </a:rPr>
-              <a:t> = “</a:t>
-            </a:r>
-            <a:r>
-              <a:rPr lang="en-US" sz="1400" dirty="0" err="1">
-                <a:latin typeface="Consolas" panose="020B0609020204030204" pitchFamily="49" charset="0"/>
-                <a:cs typeface="Consolas" panose="020B0609020204030204" pitchFamily="49" charset="0"/>
-              </a:rPr>
-              <a:t>Villian</a:t>
-            </a:r>
+              <a:t> = “Villain”; </a:t>
+            </a:r>
+          </a:p>
+          <a:p>
+            <a:endParaRPr lang="en-US" sz="1400" dirty="0">
+              <a:latin typeface="Consolas" panose="020B0609020204030204" pitchFamily="49" charset="0"/>
+              <a:cs typeface="Consolas" panose="020B0609020204030204" pitchFamily="49" charset="0"/>
+            </a:endParaRPr>
+          </a:p>
+          <a:p>
             <a:r>
               <a:rPr lang="en-US" sz="1400" dirty="0">
                 <a:latin typeface="Consolas" panose="020B0609020204030204" pitchFamily="49" charset="0"/>
                 <a:cs typeface="Consolas" panose="020B0609020204030204" pitchFamily="49" charset="0"/>
               </a:rPr>
-              <a:t>”; // ERROR!! Won’t compile</a:t>
-            </a:r>
-          </a:p>
-          <a:p>
-            <a:endParaRPr lang="en-US" sz="1400" dirty="0">
-              <a:latin typeface="Consolas" panose="020B0609020204030204" pitchFamily="49" charset="0"/>
-              <a:cs typeface="Consolas" panose="020B0609020204030204" pitchFamily="49" charset="0"/>
-            </a:endParaRPr>
-          </a:p>
-          <a:p>
-            <a:r>
-              <a:rPr lang="en-US" sz="1400" dirty="0">
-                <a:latin typeface="Consolas" panose="020B0609020204030204" pitchFamily="49" charset="0"/>
-                <a:cs typeface="Consolas" panose="020B0609020204030204" pitchFamily="49" charset="0"/>
-              </a:rPr>
-              <a:t>       Hero ajax = new Hero(); // have to build the object</a:t>
+              <a:t>       Hero ajax = new Hero(); // must build the object</a:t>
             </a:r>
           </a:p>
           <a:p>
@@ -8128,6 +8117,204 @@
           </a:p>
         </p:txBody>
       </p:sp>
+      <p:sp>
+        <p:nvSpPr>
+          <p:cNvPr id="5" name="Left Arrow 4">
+            <a:extLst>
+              <a:ext uri="{FF2B5EF4-FFF2-40B4-BE49-F238E27FC236}">
+                <a16:creationId xmlns:a16="http://schemas.microsoft.com/office/drawing/2014/main" id="{1E003037-F12F-6540-8FAC-92BEBE36A8D5}"/>
+              </a:ext>
+            </a:extLst>
+          </p:cNvPr>
+          <p:cNvSpPr/>
+          <p:nvPr/>
+        </p:nvSpPr>
+        <p:spPr>
+          <a:xfrm>
+            <a:off x="4854532" y="3360107"/>
+            <a:ext cx="2054268" cy="475989"/>
+          </a:xfrm>
+          <a:prstGeom prst="leftArrow">
+            <a:avLst/>
+          </a:prstGeom>
+          <a:solidFill>
+            <a:schemeClr val="accent1"/>
+          </a:solidFill>
+          <a:ln>
+            <a:noFill/>
+          </a:ln>
+          <a:effectLst/>
+        </p:spPr>
+        <p:style>
+          <a:lnRef idx="1">
+            <a:schemeClr val="accent1"/>
+          </a:lnRef>
+          <a:fillRef idx="3">
+            <a:schemeClr val="accent1"/>
+          </a:fillRef>
+          <a:effectRef idx="2">
+            <a:schemeClr val="accent1"/>
+          </a:effectRef>
+          <a:fontRef idx="minor">
+            <a:schemeClr val="lt1"/>
+          </a:fontRef>
+        </p:style>
+        <p:txBody>
+          <a:bodyPr lIns="274320" tIns="182880" rIns="274320" bIns="182880" rtlCol="0" anchor="ctr"/>
+          <a:lstStyle/>
+          <a:p>
+            <a:pPr algn="ctr"/>
+            <a:r>
+              <a:rPr lang="en-US" sz="1400" dirty="0">
+                <a:solidFill>
+                  <a:schemeClr val="tx1"/>
+                </a:solidFill>
+                <a:latin typeface="Proxima Nova" charset="0"/>
+                <a:ea typeface="Proxima Nova" charset="0"/>
+                <a:cs typeface="Proxima Nova" charset="0"/>
+              </a:rPr>
+              <a:t>Will not compile</a:t>
+            </a:r>
+          </a:p>
+        </p:txBody>
+      </p:sp>
+      <p:sp>
+        <p:nvSpPr>
+          <p:cNvPr id="6" name="Left Arrow 5">
+            <a:extLst>
+              <a:ext uri="{FF2B5EF4-FFF2-40B4-BE49-F238E27FC236}">
+                <a16:creationId xmlns:a16="http://schemas.microsoft.com/office/drawing/2014/main" id="{D536058C-8CA8-2347-BE17-F65F1E1AF260}"/>
+              </a:ext>
+            </a:extLst>
+          </p:cNvPr>
+          <p:cNvSpPr/>
+          <p:nvPr/>
+        </p:nvSpPr>
+        <p:spPr>
+          <a:xfrm>
+            <a:off x="4227533" y="5501014"/>
+            <a:ext cx="2054268" cy="475989"/>
+          </a:xfrm>
+          <a:prstGeom prst="leftArrow">
+            <a:avLst/>
+          </a:prstGeom>
+          <a:solidFill>
+            <a:schemeClr val="accent1"/>
+          </a:solidFill>
+          <a:ln>
+            <a:noFill/>
+          </a:ln>
+          <a:effectLst/>
+        </p:spPr>
+        <p:style>
+          <a:lnRef idx="1">
+            <a:schemeClr val="accent1"/>
+          </a:lnRef>
+          <a:fillRef idx="3">
+            <a:schemeClr val="accent1"/>
+          </a:fillRef>
+          <a:effectRef idx="2">
+            <a:schemeClr val="accent1"/>
+          </a:effectRef>
+          <a:fontRef idx="minor">
+            <a:schemeClr val="lt1"/>
+          </a:fontRef>
+        </p:style>
+        <p:txBody>
+          <a:bodyPr lIns="274320" tIns="182880" rIns="274320" bIns="182880" rtlCol="0" anchor="ctr"/>
+          <a:lstStyle/>
+          <a:p>
+            <a:pPr algn="ctr"/>
+            <a:r>
+              <a:rPr lang="en-US" sz="1400" dirty="0">
+                <a:solidFill>
+                  <a:schemeClr val="tx1"/>
+                </a:solidFill>
+                <a:latin typeface="Proxima Nova" charset="0"/>
+                <a:ea typeface="Proxima Nova" charset="0"/>
+                <a:cs typeface="Proxima Nova" charset="0"/>
+              </a:rPr>
+              <a:t>Will not compile</a:t>
+            </a:r>
+          </a:p>
+        </p:txBody>
+      </p:sp>
+      <p:cxnSp>
+        <p:nvCxnSpPr>
+          <p:cNvPr id="8" name="Straight Connector 7">
+            <a:extLst>
+              <a:ext uri="{FF2B5EF4-FFF2-40B4-BE49-F238E27FC236}">
+                <a16:creationId xmlns:a16="http://schemas.microsoft.com/office/drawing/2014/main" id="{18B0A6C4-DAAE-2A4E-BC59-C676D19E9C88}"/>
+              </a:ext>
+            </a:extLst>
+          </p:cNvPr>
+          <p:cNvCxnSpPr>
+            <a:cxnSpLocks/>
+          </p:cNvCxnSpPr>
+          <p:nvPr/>
+        </p:nvCxnSpPr>
+        <p:spPr>
+          <a:xfrm>
+            <a:off x="1378634" y="2433711"/>
+            <a:ext cx="4178104" cy="0"/>
+          </a:xfrm>
+          <a:prstGeom prst="line">
+            <a:avLst/>
+          </a:prstGeom>
+        </p:spPr>
+        <p:style>
+          <a:lnRef idx="2">
+            <a:schemeClr val="accent1"/>
+          </a:lnRef>
+          <a:fillRef idx="0">
+            <a:schemeClr val="accent1"/>
+          </a:fillRef>
+          <a:effectRef idx="1">
+            <a:schemeClr val="accent1"/>
+          </a:effectRef>
+          <a:fontRef idx="minor">
+            <a:schemeClr val="tx1"/>
+          </a:fontRef>
+        </p:style>
+      </p:cxnSp>
+      <p:cxnSp>
+        <p:nvCxnSpPr>
+          <p:cNvPr id="12" name="Straight Connector 11">
+            <a:extLst>
+              <a:ext uri="{FF2B5EF4-FFF2-40B4-BE49-F238E27FC236}">
+                <a16:creationId xmlns:a16="http://schemas.microsoft.com/office/drawing/2014/main" id="{4FE16595-85AC-5142-93B3-716DDFA8F66E}"/>
+              </a:ext>
+            </a:extLst>
+          </p:cNvPr>
+          <p:cNvCxnSpPr>
+            <a:cxnSpLocks/>
+          </p:cNvCxnSpPr>
+          <p:nvPr/>
+        </p:nvCxnSpPr>
+        <p:spPr>
+          <a:xfrm>
+            <a:off x="1505243" y="3050345"/>
+            <a:ext cx="3812345" cy="0"/>
+          </a:xfrm>
+          <a:prstGeom prst="line">
+            <a:avLst/>
+          </a:prstGeom>
+        </p:spPr>
+        <p:style>
+          <a:lnRef idx="2">
+            <a:schemeClr val="accent1"/>
+          </a:lnRef>
+          <a:fillRef idx="0">
+            <a:schemeClr val="accent1"/>
+          </a:fillRef>
+          <a:effectRef idx="1">
+            <a:schemeClr val="accent1"/>
+          </a:effectRef>
+          <a:fontRef idx="minor">
+            <a:schemeClr val="tx1"/>
+          </a:fontRef>
+        </p:style>
+      </p:cxnSp>
     </p:spTree>
     <p:extLst>
       <p:ext uri="{BB962C8B-B14F-4D97-AF65-F5344CB8AC3E}">
@@ -8150,6 +8337,344 @@
       </p:transition>
     </mc:Fallback>
   </mc:AlternateContent>
+  <p:timing>
+    <p:tnLst>
+      <p:par>
+        <p:cTn id="1" dur="indefinite" restart="never" nodeType="tmRoot">
+          <p:childTnLst>
+            <p:seq concurrent="1" nextAc="seek">
+              <p:cTn id="2" dur="indefinite" nodeType="mainSeq">
+                <p:childTnLst>
+                  <p:par>
+                    <p:cTn id="3" fill="hold">
+                      <p:stCondLst>
+                        <p:cond delay="indefinite"/>
+                      </p:stCondLst>
+                      <p:childTnLst>
+                        <p:par>
+                          <p:cTn id="4" fill="hold">
+                            <p:stCondLst>
+                              <p:cond delay="0"/>
+                            </p:stCondLst>
+                            <p:childTnLst>
+                              <p:par>
+                                <p:cTn id="5" presetID="55" presetClass="entr" presetSubtype="0" fill="hold" nodeType="clickEffect">
+                                  <p:stCondLst>
+                                    <p:cond delay="0"/>
+                                  </p:stCondLst>
+                                  <p:childTnLst>
+                                    <p:set>
+                                      <p:cBhvr>
+                                        <p:cTn id="6" dur="1" fill="hold">
+                                          <p:stCondLst>
+                                            <p:cond delay="0"/>
+                                          </p:stCondLst>
+                                        </p:cTn>
+                                        <p:tgtEl>
+                                          <p:spTgt spid="8"/>
+                                        </p:tgtEl>
+                                        <p:attrNameLst>
+                                          <p:attrName>style.visibility</p:attrName>
+                                        </p:attrNameLst>
+                                      </p:cBhvr>
+                                      <p:to>
+                                        <p:strVal val="visible"/>
+                                      </p:to>
+                                    </p:set>
+                                    <p:anim calcmode="lin" valueType="num">
+                                      <p:cBhvr>
+                                        <p:cTn id="7" dur="1000" fill="hold"/>
+                                        <p:tgtEl>
+                                          <p:spTgt spid="8"/>
+                                        </p:tgtEl>
+                                        <p:attrNameLst>
+                                          <p:attrName>ppt_w</p:attrName>
+                                        </p:attrNameLst>
+                                      </p:cBhvr>
+                                      <p:tavLst>
+                                        <p:tav tm="0">
+                                          <p:val>
+                                            <p:strVal val="#ppt_w*0.70"/>
+                                          </p:val>
+                                        </p:tav>
+                                        <p:tav tm="100000">
+                                          <p:val>
+                                            <p:strVal val="#ppt_w"/>
+                                          </p:val>
+                                        </p:tav>
+                                      </p:tavLst>
+                                    </p:anim>
+                                    <p:anim calcmode="lin" valueType="num">
+                                      <p:cBhvr>
+                                        <p:cTn id="8" dur="1000" fill="hold"/>
+                                        <p:tgtEl>
+                                          <p:spTgt spid="8"/>
+                                        </p:tgtEl>
+                                        <p:attrNameLst>
+                                          <p:attrName>ppt_h</p:attrName>
+                                        </p:attrNameLst>
+                                      </p:cBhvr>
+                                      <p:tavLst>
+                                        <p:tav tm="0">
+                                          <p:val>
+                                            <p:strVal val="#ppt_h"/>
+                                          </p:val>
+                                        </p:tav>
+                                        <p:tav tm="100000">
+                                          <p:val>
+                                            <p:strVal val="#ppt_h"/>
+                                          </p:val>
+                                        </p:tav>
+                                      </p:tavLst>
+                                    </p:anim>
+                                    <p:animEffect transition="in" filter="fade">
+                                      <p:cBhvr>
+                                        <p:cTn id="9" dur="1000"/>
+                                        <p:tgtEl>
+                                          <p:spTgt spid="8"/>
+                                        </p:tgtEl>
+                                      </p:cBhvr>
+                                    </p:animEffect>
+                                  </p:childTnLst>
+                                </p:cTn>
+                              </p:par>
+                            </p:childTnLst>
+                          </p:cTn>
+                        </p:par>
+                      </p:childTnLst>
+                    </p:cTn>
+                  </p:par>
+                  <p:par>
+                    <p:cTn id="10" fill="hold">
+                      <p:stCondLst>
+                        <p:cond delay="indefinite"/>
+                      </p:stCondLst>
+                      <p:childTnLst>
+                        <p:par>
+                          <p:cTn id="11" fill="hold">
+                            <p:stCondLst>
+                              <p:cond delay="0"/>
+                            </p:stCondLst>
+                            <p:childTnLst>
+                              <p:par>
+                                <p:cTn id="12" presetID="55" presetClass="entr" presetSubtype="0" fill="hold" nodeType="clickEffect">
+                                  <p:stCondLst>
+                                    <p:cond delay="0"/>
+                                  </p:stCondLst>
+                                  <p:childTnLst>
+                                    <p:set>
+                                      <p:cBhvr>
+                                        <p:cTn id="13" dur="1" fill="hold">
+                                          <p:stCondLst>
+                                            <p:cond delay="0"/>
+                                          </p:stCondLst>
+                                        </p:cTn>
+                                        <p:tgtEl>
+                                          <p:spTgt spid="12"/>
+                                        </p:tgtEl>
+                                        <p:attrNameLst>
+                                          <p:attrName>style.visibility</p:attrName>
+                                        </p:attrNameLst>
+                                      </p:cBhvr>
+                                      <p:to>
+                                        <p:strVal val="visible"/>
+                                      </p:to>
+                                    </p:set>
+                                    <p:anim calcmode="lin" valueType="num">
+                                      <p:cBhvr>
+                                        <p:cTn id="14" dur="1000" fill="hold"/>
+                                        <p:tgtEl>
+                                          <p:spTgt spid="12"/>
+                                        </p:tgtEl>
+                                        <p:attrNameLst>
+                                          <p:attrName>ppt_w</p:attrName>
+                                        </p:attrNameLst>
+                                      </p:cBhvr>
+                                      <p:tavLst>
+                                        <p:tav tm="0">
+                                          <p:val>
+                                            <p:strVal val="#ppt_w*0.70"/>
+                                          </p:val>
+                                        </p:tav>
+                                        <p:tav tm="100000">
+                                          <p:val>
+                                            <p:strVal val="#ppt_w"/>
+                                          </p:val>
+                                        </p:tav>
+                                      </p:tavLst>
+                                    </p:anim>
+                                    <p:anim calcmode="lin" valueType="num">
+                                      <p:cBhvr>
+                                        <p:cTn id="15" dur="1000" fill="hold"/>
+                                        <p:tgtEl>
+                                          <p:spTgt spid="12"/>
+                                        </p:tgtEl>
+                                        <p:attrNameLst>
+                                          <p:attrName>ppt_h</p:attrName>
+                                        </p:attrNameLst>
+                                      </p:cBhvr>
+                                      <p:tavLst>
+                                        <p:tav tm="0">
+                                          <p:val>
+                                            <p:strVal val="#ppt_h"/>
+                                          </p:val>
+                                        </p:tav>
+                                        <p:tav tm="100000">
+                                          <p:val>
+                                            <p:strVal val="#ppt_h"/>
+                                          </p:val>
+                                        </p:tav>
+                                      </p:tavLst>
+                                    </p:anim>
+                                    <p:animEffect transition="in" filter="fade">
+                                      <p:cBhvr>
+                                        <p:cTn id="16" dur="1000"/>
+                                        <p:tgtEl>
+                                          <p:spTgt spid="12"/>
+                                        </p:tgtEl>
+                                      </p:cBhvr>
+                                    </p:animEffect>
+                                  </p:childTnLst>
+                                </p:cTn>
+                              </p:par>
+                            </p:childTnLst>
+                          </p:cTn>
+                        </p:par>
+                      </p:childTnLst>
+                    </p:cTn>
+                  </p:par>
+                  <p:par>
+                    <p:cTn id="17" fill="hold">
+                      <p:stCondLst>
+                        <p:cond delay="indefinite"/>
+                      </p:stCondLst>
+                      <p:childTnLst>
+                        <p:par>
+                          <p:cTn id="18" fill="hold">
+                            <p:stCondLst>
+                              <p:cond delay="0"/>
+                            </p:stCondLst>
+                            <p:childTnLst>
+                              <p:par>
+                                <p:cTn id="19" presetID="9" presetClass="entr" presetSubtype="0" fill="hold" grpId="0" nodeType="clickEffect">
+                                  <p:stCondLst>
+                                    <p:cond delay="0"/>
+                                  </p:stCondLst>
+                                  <p:childTnLst>
+                                    <p:set>
+                                      <p:cBhvr>
+                                        <p:cTn id="20" dur="1" fill="hold">
+                                          <p:stCondLst>
+                                            <p:cond delay="0"/>
+                                          </p:stCondLst>
+                                        </p:cTn>
+                                        <p:tgtEl>
+                                          <p:spTgt spid="5"/>
+                                        </p:tgtEl>
+                                        <p:attrNameLst>
+                                          <p:attrName>style.visibility</p:attrName>
+                                        </p:attrNameLst>
+                                      </p:cBhvr>
+                                      <p:to>
+                                        <p:strVal val="visible"/>
+                                      </p:to>
+                                    </p:set>
+                                    <p:animEffect transition="in" filter="dissolve">
+                                      <p:cBhvr>
+                                        <p:cTn id="21" dur="500"/>
+                                        <p:tgtEl>
+                                          <p:spTgt spid="5"/>
+                                        </p:tgtEl>
+                                      </p:cBhvr>
+                                    </p:animEffect>
+                                  </p:childTnLst>
+                                </p:cTn>
+                              </p:par>
+                            </p:childTnLst>
+                          </p:cTn>
+                        </p:par>
+                      </p:childTnLst>
+                    </p:cTn>
+                  </p:par>
+                  <p:par>
+                    <p:cTn id="22" fill="hold">
+                      <p:stCondLst>
+                        <p:cond delay="indefinite"/>
+                      </p:stCondLst>
+                      <p:childTnLst>
+                        <p:par>
+                          <p:cTn id="23" fill="hold">
+                            <p:stCondLst>
+                              <p:cond delay="0"/>
+                            </p:stCondLst>
+                            <p:childTnLst>
+                              <p:par>
+                                <p:cTn id="24" presetID="9" presetClass="entr" presetSubtype="0" fill="hold" grpId="0" nodeType="clickEffect">
+                                  <p:stCondLst>
+                                    <p:cond delay="0"/>
+                                  </p:stCondLst>
+                                  <p:childTnLst>
+                                    <p:set>
+                                      <p:cBhvr>
+                                        <p:cTn id="25" dur="1" fill="hold">
+                                          <p:stCondLst>
+                                            <p:cond delay="0"/>
+                                          </p:stCondLst>
+                                        </p:cTn>
+                                        <p:tgtEl>
+                                          <p:spTgt spid="6"/>
+                                        </p:tgtEl>
+                                        <p:attrNameLst>
+                                          <p:attrName>style.visibility</p:attrName>
+                                        </p:attrNameLst>
+                                      </p:cBhvr>
+                                      <p:to>
+                                        <p:strVal val="visible"/>
+                                      </p:to>
+                                    </p:set>
+                                    <p:animEffect transition="in" filter="dissolve">
+                                      <p:cBhvr>
+                                        <p:cTn id="26" dur="500"/>
+                                        <p:tgtEl>
+                                          <p:spTgt spid="6"/>
+                                        </p:tgtEl>
+                                      </p:cBhvr>
+                                    </p:animEffect>
+                                  </p:childTnLst>
+                                </p:cTn>
+                              </p:par>
+                            </p:childTnLst>
+                          </p:cTn>
+                        </p:par>
+                      </p:childTnLst>
+                    </p:cTn>
+                  </p:par>
+                </p:childTnLst>
+              </p:cTn>
+              <p:prevCondLst>
+                <p:cond evt="onPrev" delay="0">
+                  <p:tgtEl>
+                    <p:sldTgt/>
+                  </p:tgtEl>
+                </p:cond>
+              </p:prevCondLst>
+              <p:nextCondLst>
+                <p:cond evt="onNext" delay="0">
+                  <p:tgtEl>
+                    <p:sldTgt/>
+                  </p:tgtEl>
+                </p:cond>
+              </p:nextCondLst>
+            </p:seq>
+          </p:childTnLst>
+        </p:cTn>
+      </p:par>
+    </p:tnLst>
+    <p:bldLst>
+      <p:bldP spid="5" grpId="0" animBg="1"/>
+      <p:bldP spid="6" grpId="0" animBg="1"/>
+    </p:bldLst>
+  </p:timing>
 </p:sld>
 </file>
 

</xml_diff>